<commit_message>
Week 4 Presentation v2
</commit_message>
<xml_diff>
--- a/Presentations/Week 4 Presentation.pptx
+++ b/Presentations/Week 4 Presentation.pptx
@@ -106,6 +106,11 @@
       </a:defRPr>
     </a:lvl9pPr>
   </p:defaultTextStyle>
+  <p:extLst>
+    <p:ext uri="{EFAFB233-063F-42B5-8137-9DF3F51BA10A}">
+      <p15:sldGuideLst xmlns:p15="http://schemas.microsoft.com/office/powerpoint/2012/main"/>
+    </p:ext>
+  </p:extLst>
 </p:presentation>
 </file>
 
@@ -154,7 +159,6 @@
               <a:rPr lang="en-US"/>
               <a:t>Click to edit Master title style</a:t>
             </a:r>
-            <a:endParaRPr lang="en-US"/>
           </a:p>
         </p:txBody>
       </p:sp>
@@ -219,7 +223,6 @@
               <a:rPr lang="en-US"/>
               <a:t>Click to edit Master subtitle style</a:t>
             </a:r>
-            <a:endParaRPr lang="en-US"/>
           </a:p>
         </p:txBody>
       </p:sp>
@@ -240,7 +243,7 @@
           <a:p>
             <a:fld id="{6BC729F5-EBEB-4E15-B9D2-C2952D287289}" type="datetimeFigureOut">
               <a:rPr lang="en-US" smtClean="0"/>
-              <a:t>2/23/2017</a:t>
+              <a:t>2/24/2017</a:t>
             </a:fld>
             <a:endParaRPr lang="en-US"/>
           </a:p>
@@ -337,7 +340,6 @@
               <a:rPr lang="en-US"/>
               <a:t>Click to edit Master title style</a:t>
             </a:r>
-            <a:endParaRPr lang="en-US"/>
           </a:p>
         </p:txBody>
       </p:sp>
@@ -389,7 +391,6 @@
               <a:rPr lang="en-US"/>
               <a:t>Fifth level</a:t>
             </a:r>
-            <a:endParaRPr lang="en-US"/>
           </a:p>
         </p:txBody>
       </p:sp>
@@ -410,7 +411,7 @@
           <a:p>
             <a:fld id="{6BC729F5-EBEB-4E15-B9D2-C2952D287289}" type="datetimeFigureOut">
               <a:rPr lang="en-US" smtClean="0"/>
-              <a:t>2/23/2017</a:t>
+              <a:t>2/24/2017</a:t>
             </a:fld>
             <a:endParaRPr lang="en-US"/>
           </a:p>
@@ -512,7 +513,6 @@
               <a:rPr lang="en-US"/>
               <a:t>Click to edit Master title style</a:t>
             </a:r>
-            <a:endParaRPr lang="en-US"/>
           </a:p>
         </p:txBody>
       </p:sp>
@@ -569,7 +569,6 @@
               <a:rPr lang="en-US"/>
               <a:t>Fifth level</a:t>
             </a:r>
-            <a:endParaRPr lang="en-US"/>
           </a:p>
         </p:txBody>
       </p:sp>
@@ -590,7 +589,7 @@
           <a:p>
             <a:fld id="{6BC729F5-EBEB-4E15-B9D2-C2952D287289}" type="datetimeFigureOut">
               <a:rPr lang="en-US" smtClean="0"/>
-              <a:t>2/23/2017</a:t>
+              <a:t>2/24/2017</a:t>
             </a:fld>
             <a:endParaRPr lang="en-US"/>
           </a:p>
@@ -687,7 +686,6 @@
               <a:rPr lang="en-US"/>
               <a:t>Click to edit Master title style</a:t>
             </a:r>
-            <a:endParaRPr lang="en-US"/>
           </a:p>
         </p:txBody>
       </p:sp>
@@ -739,7 +737,6 @@
               <a:rPr lang="en-US"/>
               <a:t>Fifth level</a:t>
             </a:r>
-            <a:endParaRPr lang="en-US"/>
           </a:p>
         </p:txBody>
       </p:sp>
@@ -760,7 +757,7 @@
           <a:p>
             <a:fld id="{6BC729F5-EBEB-4E15-B9D2-C2952D287289}" type="datetimeFigureOut">
               <a:rPr lang="en-US" smtClean="0"/>
-              <a:t>2/23/2017</a:t>
+              <a:t>2/24/2017</a:t>
             </a:fld>
             <a:endParaRPr lang="en-US"/>
           </a:p>
@@ -866,7 +863,6 @@
               <a:rPr lang="en-US"/>
               <a:t>Click to edit Master title style</a:t>
             </a:r>
-            <a:endParaRPr lang="en-US"/>
           </a:p>
         </p:txBody>
       </p:sp>
@@ -1006,7 +1002,7 @@
           <a:p>
             <a:fld id="{6BC729F5-EBEB-4E15-B9D2-C2952D287289}" type="datetimeFigureOut">
               <a:rPr lang="en-US" smtClean="0"/>
-              <a:t>2/23/2017</a:t>
+              <a:t>2/24/2017</a:t>
             </a:fld>
             <a:endParaRPr lang="en-US"/>
           </a:p>
@@ -1103,7 +1099,6 @@
               <a:rPr lang="en-US"/>
               <a:t>Click to edit Master title style</a:t>
             </a:r>
-            <a:endParaRPr lang="en-US"/>
           </a:p>
         </p:txBody>
       </p:sp>
@@ -1160,7 +1155,6 @@
               <a:rPr lang="en-US"/>
               <a:t>Fifth level</a:t>
             </a:r>
-            <a:endParaRPr lang="en-US"/>
           </a:p>
         </p:txBody>
       </p:sp>
@@ -1217,7 +1211,6 @@
               <a:rPr lang="en-US"/>
               <a:t>Fifth level</a:t>
             </a:r>
-            <a:endParaRPr lang="en-US"/>
           </a:p>
         </p:txBody>
       </p:sp>
@@ -1238,7 +1231,7 @@
           <a:p>
             <a:fld id="{6BC729F5-EBEB-4E15-B9D2-C2952D287289}" type="datetimeFigureOut">
               <a:rPr lang="en-US" smtClean="0"/>
-              <a:t>2/23/2017</a:t>
+              <a:t>2/24/2017</a:t>
             </a:fld>
             <a:endParaRPr lang="en-US"/>
           </a:p>
@@ -1340,7 +1333,6 @@
               <a:rPr lang="en-US"/>
               <a:t>Click to edit Master title style</a:t>
             </a:r>
-            <a:endParaRPr lang="en-US"/>
           </a:p>
         </p:txBody>
       </p:sp>
@@ -1462,7 +1454,6 @@
               <a:rPr lang="en-US"/>
               <a:t>Fifth level</a:t>
             </a:r>
-            <a:endParaRPr lang="en-US"/>
           </a:p>
         </p:txBody>
       </p:sp>
@@ -1584,7 +1575,6 @@
               <a:rPr lang="en-US"/>
               <a:t>Fifth level</a:t>
             </a:r>
-            <a:endParaRPr lang="en-US"/>
           </a:p>
         </p:txBody>
       </p:sp>
@@ -1605,7 +1595,7 @@
           <a:p>
             <a:fld id="{6BC729F5-EBEB-4E15-B9D2-C2952D287289}" type="datetimeFigureOut">
               <a:rPr lang="en-US" smtClean="0"/>
-              <a:t>2/23/2017</a:t>
+              <a:t>2/24/2017</a:t>
             </a:fld>
             <a:endParaRPr lang="en-US"/>
           </a:p>
@@ -1702,7 +1692,6 @@
               <a:rPr lang="en-US"/>
               <a:t>Click to edit Master title style</a:t>
             </a:r>
-            <a:endParaRPr lang="en-US"/>
           </a:p>
         </p:txBody>
       </p:sp>
@@ -1723,7 +1712,7 @@
           <a:p>
             <a:fld id="{6BC729F5-EBEB-4E15-B9D2-C2952D287289}" type="datetimeFigureOut">
               <a:rPr lang="en-US" smtClean="0"/>
-              <a:t>2/23/2017</a:t>
+              <a:t>2/24/2017</a:t>
             </a:fld>
             <a:endParaRPr lang="en-US"/>
           </a:p>
@@ -1818,7 +1807,7 @@
           <a:p>
             <a:fld id="{6BC729F5-EBEB-4E15-B9D2-C2952D287289}" type="datetimeFigureOut">
               <a:rPr lang="en-US" smtClean="0"/>
-              <a:t>2/23/2017</a:t>
+              <a:t>2/24/2017</a:t>
             </a:fld>
             <a:endParaRPr lang="en-US"/>
           </a:p>
@@ -1924,7 +1913,6 @@
               <a:rPr lang="en-US"/>
               <a:t>Click to edit Master title style</a:t>
             </a:r>
-            <a:endParaRPr lang="en-US"/>
           </a:p>
         </p:txBody>
       </p:sp>
@@ -2009,7 +1997,6 @@
               <a:rPr lang="en-US"/>
               <a:t>Fifth level</a:t>
             </a:r>
-            <a:endParaRPr lang="en-US"/>
           </a:p>
         </p:txBody>
       </p:sp>
@@ -2095,7 +2082,7 @@
           <a:p>
             <a:fld id="{6BC729F5-EBEB-4E15-B9D2-C2952D287289}" type="datetimeFigureOut">
               <a:rPr lang="en-US" smtClean="0"/>
-              <a:t>2/23/2017</a:t>
+              <a:t>2/24/2017</a:t>
             </a:fld>
             <a:endParaRPr lang="en-US"/>
           </a:p>
@@ -2201,7 +2188,6 @@
               <a:rPr lang="en-US"/>
               <a:t>Click to edit Master title style</a:t>
             </a:r>
-            <a:endParaRPr lang="en-US"/>
           </a:p>
         </p:txBody>
       </p:sp>
@@ -2348,7 +2334,7 @@
           <a:p>
             <a:fld id="{6BC729F5-EBEB-4E15-B9D2-C2952D287289}" type="datetimeFigureOut">
               <a:rPr lang="en-US" smtClean="0"/>
-              <a:t>2/23/2017</a:t>
+              <a:t>2/24/2017</a:t>
             </a:fld>
             <a:endParaRPr lang="en-US"/>
           </a:p>
@@ -2460,7 +2446,6 @@
               <a:rPr lang="en-US"/>
               <a:t>Click to edit Master title style</a:t>
             </a:r>
-            <a:endParaRPr lang="en-US"/>
           </a:p>
         </p:txBody>
       </p:sp>
@@ -2522,7 +2507,6 @@
               <a:rPr lang="en-US"/>
               <a:t>Fifth level</a:t>
             </a:r>
-            <a:endParaRPr lang="en-US"/>
           </a:p>
         </p:txBody>
       </p:sp>
@@ -2561,7 +2545,7 @@
           <a:p>
             <a:fld id="{6BC729F5-EBEB-4E15-B9D2-C2952D287289}" type="datetimeFigureOut">
               <a:rPr lang="en-US" smtClean="0"/>
-              <a:t>2/23/2017</a:t>
+              <a:t>2/24/2017</a:t>
             </a:fld>
             <a:endParaRPr lang="en-US"/>
           </a:p>
@@ -3203,7 +3187,11 @@
           <a:bodyPr/>
           <a:lstStyle/>
           <a:p>
-            <a:endParaRPr lang="en-US"/>
+            <a:r>
+              <a:rPr lang="en-US" dirty="0" smtClean="0"/>
+              <a:t>Goals for this coming week:	</a:t>
+            </a:r>
+            <a:endParaRPr lang="en-US" dirty="0"/>
           </a:p>
         </p:txBody>
       </p:sp>
@@ -3222,7 +3210,61 @@
           <a:bodyPr/>
           <a:lstStyle/>
           <a:p>
-            <a:endParaRPr lang="en-US"/>
+            <a:r>
+              <a:rPr lang="en-US" dirty="0" smtClean="0"/>
+              <a:t>Create a ‘</a:t>
+            </a:r>
+            <a:r>
+              <a:rPr lang="en-US" dirty="0" err="1" smtClean="0"/>
+              <a:t>wireframed</a:t>
+            </a:r>
+            <a:r>
+              <a:rPr lang="en-US" dirty="0" smtClean="0"/>
+              <a:t>’ </a:t>
+            </a:r>
+            <a:r>
+              <a:rPr lang="en-US" dirty="0" err="1" smtClean="0"/>
+              <a:t>webapp</a:t>
+            </a:r>
+            <a:r>
+              <a:rPr lang="en-US" dirty="0" smtClean="0"/>
+              <a:t> in which we will have implemented the basic spatial layout of the site.</a:t>
+            </a:r>
+          </a:p>
+          <a:p>
+            <a:r>
+              <a:rPr lang="en-US" dirty="0" smtClean="0"/>
+              <a:t>Connect site to MySQL DB and be able to run queries against DB.</a:t>
+            </a:r>
+          </a:p>
+          <a:p>
+            <a:endParaRPr lang="en-US" dirty="0"/>
+          </a:p>
+          <a:p>
+            <a:pPr marL="0" indent="0">
+              <a:buNone/>
+            </a:pPr>
+            <a:r>
+              <a:rPr lang="en-US" dirty="0" smtClean="0"/>
+              <a:t>Hopes for this coming week:</a:t>
+            </a:r>
+          </a:p>
+          <a:p>
+            <a:pPr marL="0" indent="0">
+              <a:buNone/>
+            </a:pPr>
+            <a:r>
+              <a:rPr lang="en-US" dirty="0" smtClean="0"/>
+              <a:t>-Using the Google Map API, hardcode values into the </a:t>
+            </a:r>
+            <a:r>
+              <a:rPr lang="en-US" dirty="0" err="1" smtClean="0"/>
+              <a:t>Haversine</a:t>
+            </a:r>
+            <a:r>
+              <a:rPr lang="en-US" dirty="0" smtClean="0"/>
+              <a:t> formula and successfully generate a pinned map of nearby parks. </a:t>
+            </a:r>
           </a:p>
         </p:txBody>
       </p:sp>

</xml_diff>